<commit_message>
fixing figures for lamit
</commit_message>
<xml_diff>
--- a/results/netfigs1&2.pptx
+++ b/results/netfigs1&2.pptx
@@ -6,9 +6,8 @@
   </p:sldMasterIdLst>
   <p:sldIdLst>
     <p:sldId id="256" r:id="rId2"/>
-    <p:sldId id="257" r:id="rId3"/>
   </p:sldIdLst>
-  <p:sldSz cx="9144000" cy="6858000" type="screen4x3"/>
+  <p:sldSz cx="6858000" cy="9144000" type="screen4x3"/>
   <p:notesSz cx="6858000" cy="9144000"/>
   <p:defaultTextStyle>
     <a:defPPr>
@@ -137,8 +136,8 @@
         </p:nvSpPr>
         <p:spPr>
           <a:xfrm>
-            <a:off x="685800" y="2130425"/>
-            <a:ext cx="7772400" cy="1470025"/>
+            <a:off x="514350" y="2840568"/>
+            <a:ext cx="5829300" cy="1960033"/>
           </a:xfrm>
         </p:spPr>
         <p:txBody>
@@ -164,8 +163,8 @@
         </p:nvSpPr>
         <p:spPr>
           <a:xfrm>
-            <a:off x="1371600" y="3886200"/>
-            <a:ext cx="6400800" cy="1752600"/>
+            <a:off x="1028700" y="5181600"/>
+            <a:ext cx="4800600" cy="2336800"/>
           </a:xfrm>
         </p:spPr>
         <p:txBody>
@@ -286,7 +285,7 @@
           <a:lstStyle/>
           <a:p>
             <a:fld id="{E656DA28-9E1B-1B46-A8C3-134B9DCAA4BB}" type="datetimeFigureOut">
-              <a:t>7/16/14</a:t>
+              <a:t>11/26/14</a:t>
             </a:fld>
             <a:endParaRPr lang="en-US"/>
           </a:p>
@@ -452,7 +451,7 @@
           <a:lstStyle/>
           <a:p>
             <a:fld id="{E656DA28-9E1B-1B46-A8C3-134B9DCAA4BB}" type="datetimeFigureOut">
-              <a:t>7/16/14</a:t>
+              <a:t>11/26/14</a:t>
             </a:fld>
             <a:endParaRPr lang="en-US"/>
           </a:p>
@@ -541,8 +540,8 @@
         </p:nvSpPr>
         <p:spPr>
           <a:xfrm>
-            <a:off x="6629400" y="274638"/>
-            <a:ext cx="2057400" cy="5851525"/>
+            <a:off x="4972050" y="366185"/>
+            <a:ext cx="1543050" cy="7802033"/>
           </a:xfrm>
         </p:spPr>
         <p:txBody>
@@ -568,8 +567,8 @@
         </p:nvSpPr>
         <p:spPr>
           <a:xfrm>
-            <a:off x="457200" y="274638"/>
-            <a:ext cx="6019800" cy="5851525"/>
+            <a:off x="342900" y="366185"/>
+            <a:ext cx="4514850" cy="7802033"/>
           </a:xfrm>
         </p:spPr>
         <p:txBody>
@@ -628,7 +627,7 @@
           <a:lstStyle/>
           <a:p>
             <a:fld id="{E656DA28-9E1B-1B46-A8C3-134B9DCAA4BB}" type="datetimeFigureOut">
-              <a:t>7/16/14</a:t>
+              <a:t>11/26/14</a:t>
             </a:fld>
             <a:endParaRPr lang="en-US"/>
           </a:p>
@@ -794,7 +793,7 @@
           <a:lstStyle/>
           <a:p>
             <a:fld id="{E656DA28-9E1B-1B46-A8C3-134B9DCAA4BB}" type="datetimeFigureOut">
-              <a:t>7/16/14</a:t>
+              <a:t>11/26/14</a:t>
             </a:fld>
             <a:endParaRPr lang="en-US"/>
           </a:p>
@@ -883,8 +882,8 @@
         </p:nvSpPr>
         <p:spPr>
           <a:xfrm>
-            <a:off x="722313" y="4406900"/>
-            <a:ext cx="7772400" cy="1362075"/>
+            <a:off x="541735" y="5875867"/>
+            <a:ext cx="5829300" cy="1816100"/>
           </a:xfrm>
         </p:spPr>
         <p:txBody>
@@ -914,8 +913,8 @@
         </p:nvSpPr>
         <p:spPr>
           <a:xfrm>
-            <a:off x="722313" y="2906713"/>
-            <a:ext cx="7772400" cy="1500187"/>
+            <a:off x="541735" y="3875618"/>
+            <a:ext cx="5829300" cy="2000249"/>
           </a:xfrm>
         </p:spPr>
         <p:txBody>
@@ -1037,7 +1036,7 @@
           <a:lstStyle/>
           <a:p>
             <a:fld id="{E656DA28-9E1B-1B46-A8C3-134B9DCAA4BB}" type="datetimeFigureOut">
-              <a:t>7/16/14</a:t>
+              <a:t>11/26/14</a:t>
             </a:fld>
             <a:endParaRPr lang="en-US"/>
           </a:p>
@@ -1148,8 +1147,8 @@
         </p:nvSpPr>
         <p:spPr>
           <a:xfrm>
-            <a:off x="457200" y="1600200"/>
-            <a:ext cx="4038600" cy="4525963"/>
+            <a:off x="342900" y="2133601"/>
+            <a:ext cx="3028950" cy="6034617"/>
           </a:xfrm>
         </p:spPr>
         <p:txBody>
@@ -1232,8 +1231,8 @@
         </p:nvSpPr>
         <p:spPr>
           <a:xfrm>
-            <a:off x="4648200" y="1600200"/>
-            <a:ext cx="4038600" cy="4525963"/>
+            <a:off x="3486150" y="2133601"/>
+            <a:ext cx="3028950" cy="6034617"/>
           </a:xfrm>
         </p:spPr>
         <p:txBody>
@@ -1320,7 +1319,7 @@
           <a:lstStyle/>
           <a:p>
             <a:fld id="{E656DA28-9E1B-1B46-A8C3-134B9DCAA4BB}" type="datetimeFigureOut">
-              <a:t>7/16/14</a:t>
+              <a:t>11/26/14</a:t>
             </a:fld>
             <a:endParaRPr lang="en-US"/>
           </a:p>
@@ -1435,8 +1434,8 @@
         </p:nvSpPr>
         <p:spPr>
           <a:xfrm>
-            <a:off x="457200" y="1535113"/>
-            <a:ext cx="4040188" cy="639762"/>
+            <a:off x="342900" y="2046817"/>
+            <a:ext cx="3030141" cy="853016"/>
           </a:xfrm>
         </p:spPr>
         <p:txBody>
@@ -1500,8 +1499,8 @@
         </p:nvSpPr>
         <p:spPr>
           <a:xfrm>
-            <a:off x="457200" y="2174875"/>
-            <a:ext cx="4040188" cy="3951288"/>
+            <a:off x="342900" y="2899833"/>
+            <a:ext cx="3030141" cy="5268384"/>
           </a:xfrm>
         </p:spPr>
         <p:txBody>
@@ -1584,8 +1583,8 @@
         </p:nvSpPr>
         <p:spPr>
           <a:xfrm>
-            <a:off x="4645025" y="1535113"/>
-            <a:ext cx="4041775" cy="639762"/>
+            <a:off x="3483769" y="2046817"/>
+            <a:ext cx="3031331" cy="853016"/>
           </a:xfrm>
         </p:spPr>
         <p:txBody>
@@ -1649,8 +1648,8 @@
         </p:nvSpPr>
         <p:spPr>
           <a:xfrm>
-            <a:off x="4645025" y="2174875"/>
-            <a:ext cx="4041775" cy="3951288"/>
+            <a:off x="3483769" y="2899833"/>
+            <a:ext cx="3031331" cy="5268384"/>
           </a:xfrm>
         </p:spPr>
         <p:txBody>
@@ -1737,7 +1736,7 @@
           <a:lstStyle/>
           <a:p>
             <a:fld id="{E656DA28-9E1B-1B46-A8C3-134B9DCAA4BB}" type="datetimeFigureOut">
-              <a:t>7/16/14</a:t>
+              <a:t>11/26/14</a:t>
             </a:fld>
             <a:endParaRPr lang="en-US"/>
           </a:p>
@@ -1852,7 +1851,7 @@
           <a:lstStyle/>
           <a:p>
             <a:fld id="{E656DA28-9E1B-1B46-A8C3-134B9DCAA4BB}" type="datetimeFigureOut">
-              <a:t>7/16/14</a:t>
+              <a:t>11/26/14</a:t>
             </a:fld>
             <a:endParaRPr lang="en-US"/>
           </a:p>
@@ -1945,7 +1944,7 @@
           <a:lstStyle/>
           <a:p>
             <a:fld id="{E656DA28-9E1B-1B46-A8C3-134B9DCAA4BB}" type="datetimeFigureOut">
-              <a:t>7/16/14</a:t>
+              <a:t>11/26/14</a:t>
             </a:fld>
             <a:endParaRPr lang="en-US"/>
           </a:p>
@@ -2034,8 +2033,8 @@
         </p:nvSpPr>
         <p:spPr>
           <a:xfrm>
-            <a:off x="457200" y="273050"/>
-            <a:ext cx="3008313" cy="1162050"/>
+            <a:off x="342900" y="364067"/>
+            <a:ext cx="2256235" cy="1549400"/>
           </a:xfrm>
         </p:spPr>
         <p:txBody>
@@ -2065,8 +2064,8 @@
         </p:nvSpPr>
         <p:spPr>
           <a:xfrm>
-            <a:off x="3575050" y="273050"/>
-            <a:ext cx="5111750" cy="5853113"/>
+            <a:off x="2681287" y="364067"/>
+            <a:ext cx="3833813" cy="7804151"/>
           </a:xfrm>
         </p:spPr>
         <p:txBody>
@@ -2149,8 +2148,8 @@
         </p:nvSpPr>
         <p:spPr>
           <a:xfrm>
-            <a:off x="457200" y="1435100"/>
-            <a:ext cx="3008313" cy="4691063"/>
+            <a:off x="342900" y="1913467"/>
+            <a:ext cx="2256235" cy="6254751"/>
           </a:xfrm>
         </p:spPr>
         <p:txBody>
@@ -2218,7 +2217,7 @@
           <a:lstStyle/>
           <a:p>
             <a:fld id="{E656DA28-9E1B-1B46-A8C3-134B9DCAA4BB}" type="datetimeFigureOut">
-              <a:t>7/16/14</a:t>
+              <a:t>11/26/14</a:t>
             </a:fld>
             <a:endParaRPr lang="en-US"/>
           </a:p>
@@ -2307,8 +2306,8 @@
         </p:nvSpPr>
         <p:spPr>
           <a:xfrm>
-            <a:off x="1792288" y="4800600"/>
-            <a:ext cx="5486400" cy="566738"/>
+            <a:off x="1344216" y="6400800"/>
+            <a:ext cx="4114800" cy="755651"/>
           </a:xfrm>
         </p:spPr>
         <p:txBody>
@@ -2338,8 +2337,8 @@
         </p:nvSpPr>
         <p:spPr>
           <a:xfrm>
-            <a:off x="1792288" y="612775"/>
-            <a:ext cx="5486400" cy="4114800"/>
+            <a:off x="1344216" y="817033"/>
+            <a:ext cx="4114800" cy="5486400"/>
           </a:xfrm>
         </p:spPr>
         <p:txBody>
@@ -2399,8 +2398,8 @@
         </p:nvSpPr>
         <p:spPr>
           <a:xfrm>
-            <a:off x="1792288" y="5367338"/>
-            <a:ext cx="5486400" cy="804862"/>
+            <a:off x="1344216" y="7156451"/>
+            <a:ext cx="4114800" cy="1073149"/>
           </a:xfrm>
         </p:spPr>
         <p:txBody>
@@ -2468,7 +2467,7 @@
           <a:lstStyle/>
           <a:p>
             <a:fld id="{E656DA28-9E1B-1B46-A8C3-134B9DCAA4BB}" type="datetimeFigureOut">
-              <a:t>7/16/14</a:t>
+              <a:t>11/26/14</a:t>
             </a:fld>
             <a:endParaRPr lang="en-US"/>
           </a:p>
@@ -2562,8 +2561,8 @@
         </p:nvSpPr>
         <p:spPr>
           <a:xfrm>
-            <a:off x="457200" y="274638"/>
-            <a:ext cx="8229600" cy="1143000"/>
+            <a:off x="342900" y="366184"/>
+            <a:ext cx="6172200" cy="1524000"/>
           </a:xfrm>
           <a:prstGeom prst="rect">
             <a:avLst/>
@@ -2594,8 +2593,8 @@
         </p:nvSpPr>
         <p:spPr>
           <a:xfrm>
-            <a:off x="457200" y="1600200"/>
-            <a:ext cx="8229600" cy="4525963"/>
+            <a:off x="342900" y="2133601"/>
+            <a:ext cx="6172200" cy="6034617"/>
           </a:xfrm>
           <a:prstGeom prst="rect">
             <a:avLst/>
@@ -2655,8 +2654,8 @@
         </p:nvSpPr>
         <p:spPr>
           <a:xfrm>
-            <a:off x="457200" y="6356350"/>
-            <a:ext cx="2133600" cy="365125"/>
+            <a:off x="342900" y="8475134"/>
+            <a:ext cx="1600200" cy="486833"/>
           </a:xfrm>
           <a:prstGeom prst="rect">
             <a:avLst/>
@@ -2677,7 +2676,7 @@
           </a:lstStyle>
           <a:p>
             <a:fld id="{E656DA28-9E1B-1B46-A8C3-134B9DCAA4BB}" type="datetimeFigureOut">
-              <a:t>7/16/14</a:t>
+              <a:t>11/26/14</a:t>
             </a:fld>
             <a:endParaRPr lang="en-US"/>
           </a:p>
@@ -2695,8 +2694,8 @@
         </p:nvSpPr>
         <p:spPr>
           <a:xfrm>
-            <a:off x="3124200" y="6356350"/>
-            <a:ext cx="2895600" cy="365125"/>
+            <a:off x="2343150" y="8475134"/>
+            <a:ext cx="2171700" cy="486833"/>
           </a:xfrm>
           <a:prstGeom prst="rect">
             <a:avLst/>
@@ -2732,8 +2731,8 @@
         </p:nvSpPr>
         <p:spPr>
           <a:xfrm>
-            <a:off x="6553200" y="6356350"/>
-            <a:ext cx="2133600" cy="365125"/>
+            <a:off x="4914900" y="8475134"/>
+            <a:ext cx="1600200" cy="486833"/>
           </a:xfrm>
           <a:prstGeom prst="rect">
             <a:avLst/>
@@ -3053,7 +3052,7 @@
       </p:grpSpPr>
       <p:pic>
         <p:nvPicPr>
-          <p:cNvPr id="5" name="Picture 4" descr="Rplot1.pdf"/>
+          <p:cNvPr id="5" name="Picture 4" descr="netFig2a.pdf"/>
           <p:cNvPicPr>
             <a:picLocks noChangeAspect="1"/>
           </p:cNvPicPr>
@@ -3061,7 +3060,6 @@
         </p:nvPicPr>
         <p:blipFill>
           <a:blip r:embed="rId2">
-            <a:lum bright="-18000"/>
             <a:extLst>
               <a:ext uri="{28A0092B-C50C-407E-A947-70E740481C1C}">
                 <a14:useLocalDpi xmlns:a14="http://schemas.microsoft.com/office/drawing/2010/main" val="0"/>
@@ -3074,491 +3072,17 @@
         </p:blipFill>
         <p:spPr>
           <a:xfrm>
-            <a:off x="261176" y="0"/>
-            <a:ext cx="8598090" cy="6858000"/>
+            <a:off x="0" y="30763"/>
+            <a:ext cx="6858000" cy="4457700"/>
           </a:xfrm>
           <a:prstGeom prst="rect">
             <a:avLst/>
           </a:prstGeom>
         </p:spPr>
       </p:pic>
-      <p:sp>
-        <p:nvSpPr>
-          <p:cNvPr id="8" name="Rectangle 7"/>
-          <p:cNvSpPr/>
-          <p:nvPr/>
-        </p:nvSpPr>
-        <p:spPr>
-          <a:xfrm>
-            <a:off x="4014958" y="594893"/>
-            <a:ext cx="1524000" cy="307474"/>
-          </a:xfrm>
-          <a:prstGeom prst="rect">
-            <a:avLst/>
-          </a:prstGeom>
-          <a:solidFill>
-            <a:schemeClr val="bg1"/>
-          </a:solidFill>
-          <a:ln>
-            <a:noFill/>
-          </a:ln>
-          <a:effectLst/>
-        </p:spPr>
-        <p:style>
-          <a:lnRef idx="1">
-            <a:schemeClr val="accent1"/>
-          </a:lnRef>
-          <a:fillRef idx="3">
-            <a:schemeClr val="accent1"/>
-          </a:fillRef>
-          <a:effectRef idx="2">
-            <a:schemeClr val="accent1"/>
-          </a:effectRef>
-          <a:fontRef idx="minor">
-            <a:schemeClr val="lt1"/>
-          </a:fontRef>
-        </p:style>
-        <p:txBody>
-          <a:bodyPr rtlCol="0" anchor="ctr"/>
-          <a:lstStyle/>
-          <a:p>
-            <a:pPr algn="ctr"/>
-            <a:r>
-              <a:rPr lang="en-US" sz="1500">
-                <a:solidFill>
-                  <a:schemeClr val="tx1"/>
-                </a:solidFill>
-                <a:latin typeface="Times New Roman"/>
-              </a:rPr>
-              <a:t>Lichen 2010</a:t>
-            </a:r>
-          </a:p>
-        </p:txBody>
-      </p:sp>
-      <p:sp>
-        <p:nvSpPr>
-          <p:cNvPr id="9" name="Rectangle 8"/>
-          <p:cNvSpPr/>
-          <p:nvPr/>
-        </p:nvSpPr>
-        <p:spPr>
-          <a:xfrm>
-            <a:off x="6204293" y="1127631"/>
-            <a:ext cx="1455826" cy="522706"/>
-          </a:xfrm>
-          <a:prstGeom prst="rect">
-            <a:avLst/>
-          </a:prstGeom>
-          <a:solidFill>
-            <a:schemeClr val="bg1"/>
-          </a:solidFill>
-          <a:ln>
-            <a:noFill/>
-          </a:ln>
-          <a:effectLst/>
-        </p:spPr>
-        <p:style>
-          <a:lnRef idx="1">
-            <a:schemeClr val="accent1"/>
-          </a:lnRef>
-          <a:fillRef idx="3">
-            <a:schemeClr val="accent1"/>
-          </a:fillRef>
-          <a:effectRef idx="2">
-            <a:schemeClr val="accent1"/>
-          </a:effectRef>
-          <a:fontRef idx="minor">
-            <a:schemeClr val="lt1"/>
-          </a:fontRef>
-        </p:style>
-        <p:txBody>
-          <a:bodyPr rtlCol="0" anchor="ctr"/>
-          <a:lstStyle/>
-          <a:p>
-            <a:pPr algn="ctr"/>
-            <a:r>
-              <a:rPr lang="en-US" sz="1500">
-                <a:solidFill>
-                  <a:schemeClr val="tx1"/>
-                </a:solidFill>
-                <a:latin typeface="Times New Roman"/>
-              </a:rPr>
-              <a:t>Ectomycorrhizal Fungi 2006</a:t>
-            </a:r>
-          </a:p>
-        </p:txBody>
-      </p:sp>
-      <p:sp>
-        <p:nvSpPr>
-          <p:cNvPr id="10" name="Rectangle 9"/>
-          <p:cNvSpPr/>
-          <p:nvPr/>
-        </p:nvSpPr>
-        <p:spPr>
-          <a:xfrm>
-            <a:off x="6964957" y="3172326"/>
-            <a:ext cx="1323469" cy="530730"/>
-          </a:xfrm>
-          <a:prstGeom prst="rect">
-            <a:avLst/>
-          </a:prstGeom>
-          <a:solidFill>
-            <a:schemeClr val="bg1"/>
-          </a:solidFill>
-          <a:ln>
-            <a:noFill/>
-          </a:ln>
-          <a:effectLst/>
-        </p:spPr>
-        <p:style>
-          <a:lnRef idx="1">
-            <a:schemeClr val="accent1"/>
-          </a:lnRef>
-          <a:fillRef idx="3">
-            <a:schemeClr val="accent1"/>
-          </a:fillRef>
-          <a:effectRef idx="2">
-            <a:schemeClr val="accent1"/>
-          </a:effectRef>
-          <a:fontRef idx="minor">
-            <a:schemeClr val="lt1"/>
-          </a:fontRef>
-        </p:style>
-        <p:txBody>
-          <a:bodyPr rtlCol="0" anchor="ctr"/>
-          <a:lstStyle/>
-          <a:p>
-            <a:pPr algn="ctr"/>
-            <a:r>
-              <a:rPr lang="en-US" sz="1500">
-                <a:solidFill>
-                  <a:schemeClr val="tx1"/>
-                </a:solidFill>
-                <a:latin typeface="Times New Roman"/>
-              </a:rPr>
-              <a:t>Soil Bacteria 2004</a:t>
-            </a:r>
-          </a:p>
-        </p:txBody>
-      </p:sp>
-      <p:sp>
-        <p:nvSpPr>
-          <p:cNvPr id="11" name="Rectangle 10"/>
-          <p:cNvSpPr/>
-          <p:nvPr/>
-        </p:nvSpPr>
-        <p:spPr>
-          <a:xfrm>
-            <a:off x="6110717" y="5141497"/>
-            <a:ext cx="1237917" cy="406397"/>
-          </a:xfrm>
-          <a:prstGeom prst="rect">
-            <a:avLst/>
-          </a:prstGeom>
-          <a:solidFill>
-            <a:schemeClr val="bg1"/>
-          </a:solidFill>
-          <a:ln>
-            <a:noFill/>
-          </a:ln>
-          <a:effectLst/>
-        </p:spPr>
-        <p:style>
-          <a:lnRef idx="1">
-            <a:schemeClr val="accent1"/>
-          </a:lnRef>
-          <a:fillRef idx="3">
-            <a:schemeClr val="accent1"/>
-          </a:fillRef>
-          <a:effectRef idx="2">
-            <a:schemeClr val="accent1"/>
-          </a:effectRef>
-          <a:fontRef idx="minor">
-            <a:schemeClr val="lt1"/>
-          </a:fontRef>
-        </p:style>
-        <p:txBody>
-          <a:bodyPr rtlCol="0" anchor="ctr"/>
-          <a:lstStyle/>
-          <a:p>
-            <a:pPr algn="ctr"/>
-            <a:r>
-              <a:rPr lang="en-US" sz="1500">
-                <a:solidFill>
-                  <a:schemeClr val="tx1"/>
-                </a:solidFill>
-                <a:latin typeface="Times New Roman"/>
-              </a:rPr>
-              <a:t>Soil Fungi 2004</a:t>
-            </a:r>
-          </a:p>
-        </p:txBody>
-      </p:sp>
-      <p:sp>
-        <p:nvSpPr>
-          <p:cNvPr id="12" name="Rectangle 11"/>
-          <p:cNvSpPr/>
-          <p:nvPr/>
-        </p:nvSpPr>
-        <p:spPr>
-          <a:xfrm>
-            <a:off x="3935677" y="5819280"/>
-            <a:ext cx="1545390" cy="423773"/>
-          </a:xfrm>
-          <a:prstGeom prst="rect">
-            <a:avLst/>
-          </a:prstGeom>
-          <a:solidFill>
-            <a:schemeClr val="bg1"/>
-          </a:solidFill>
-          <a:ln>
-            <a:noFill/>
-          </a:ln>
-          <a:effectLst/>
-        </p:spPr>
-        <p:style>
-          <a:lnRef idx="1">
-            <a:schemeClr val="accent1"/>
-          </a:lnRef>
-          <a:fillRef idx="3">
-            <a:schemeClr val="accent1"/>
-          </a:fillRef>
-          <a:effectRef idx="2">
-            <a:schemeClr val="accent1"/>
-          </a:effectRef>
-          <a:fontRef idx="minor">
-            <a:schemeClr val="lt1"/>
-          </a:fontRef>
-        </p:style>
-        <p:txBody>
-          <a:bodyPr rtlCol="0" anchor="ctr"/>
-          <a:lstStyle/>
-          <a:p>
-            <a:pPr algn="ctr"/>
-            <a:r>
-              <a:rPr lang="en-US" sz="1500">
-                <a:solidFill>
-                  <a:schemeClr val="tx1"/>
-                </a:solidFill>
-                <a:latin typeface="Times New Roman"/>
-              </a:rPr>
-              <a:t>Twig Endophyes 2006</a:t>
-            </a:r>
-          </a:p>
-        </p:txBody>
-      </p:sp>
-      <p:sp>
-        <p:nvSpPr>
-          <p:cNvPr id="13" name="Rectangle 12"/>
-          <p:cNvSpPr/>
-          <p:nvPr/>
-        </p:nvSpPr>
-        <p:spPr>
-          <a:xfrm>
-            <a:off x="1481231" y="5026533"/>
-            <a:ext cx="1526676" cy="481269"/>
-          </a:xfrm>
-          <a:prstGeom prst="rect">
-            <a:avLst/>
-          </a:prstGeom>
-          <a:solidFill>
-            <a:schemeClr val="bg1"/>
-          </a:solidFill>
-          <a:ln>
-            <a:noFill/>
-          </a:ln>
-          <a:effectLst/>
-        </p:spPr>
-        <p:style>
-          <a:lnRef idx="1">
-            <a:schemeClr val="accent1"/>
-          </a:lnRef>
-          <a:fillRef idx="3">
-            <a:schemeClr val="accent1"/>
-          </a:fillRef>
-          <a:effectRef idx="2">
-            <a:schemeClr val="accent1"/>
-          </a:effectRef>
-          <a:fontRef idx="minor">
-            <a:schemeClr val="lt1"/>
-          </a:fontRef>
-        </p:style>
-        <p:txBody>
-          <a:bodyPr rtlCol="0" anchor="ctr"/>
-          <a:lstStyle/>
-          <a:p>
-            <a:pPr algn="ctr"/>
-            <a:r>
-              <a:rPr lang="en-US" sz="1500">
-                <a:solidFill>
-                  <a:schemeClr val="tx1"/>
-                </a:solidFill>
-                <a:latin typeface="Times New Roman"/>
-              </a:rPr>
-              <a:t>Leaf Modifying Arthropods 2010</a:t>
-            </a:r>
-          </a:p>
-        </p:txBody>
-      </p:sp>
-      <p:sp>
-        <p:nvSpPr>
-          <p:cNvPr id="14" name="Rectangle 13"/>
-          <p:cNvSpPr/>
-          <p:nvPr/>
-        </p:nvSpPr>
-        <p:spPr>
-          <a:xfrm>
-            <a:off x="859600" y="3070072"/>
-            <a:ext cx="1493249" cy="651040"/>
-          </a:xfrm>
-          <a:prstGeom prst="rect">
-            <a:avLst/>
-          </a:prstGeom>
-          <a:solidFill>
-            <a:schemeClr val="bg1"/>
-          </a:solidFill>
-          <a:ln>
-            <a:noFill/>
-          </a:ln>
-          <a:effectLst/>
-        </p:spPr>
-        <p:style>
-          <a:lnRef idx="1">
-            <a:schemeClr val="accent1"/>
-          </a:lnRef>
-          <a:fillRef idx="3">
-            <a:schemeClr val="accent1"/>
-          </a:fillRef>
-          <a:effectRef idx="2">
-            <a:schemeClr val="accent1"/>
-          </a:effectRef>
-          <a:fontRef idx="minor">
-            <a:schemeClr val="lt1"/>
-          </a:fontRef>
-        </p:style>
-        <p:txBody>
-          <a:bodyPr rtlCol="0" anchor="ctr"/>
-          <a:lstStyle/>
-          <a:p>
-            <a:pPr algn="ctr"/>
-            <a:r>
-              <a:rPr lang="en-US" sz="1500">
-                <a:solidFill>
-                  <a:schemeClr val="tx1"/>
-                </a:solidFill>
-                <a:latin typeface="Times New Roman"/>
-              </a:rPr>
-              <a:t>Fungal Leaf Pathogens 2009</a:t>
-            </a:r>
-          </a:p>
-        </p:txBody>
-      </p:sp>
-      <p:sp>
-        <p:nvSpPr>
-          <p:cNvPr id="16" name="Rectangle 15"/>
-          <p:cNvSpPr/>
-          <p:nvPr/>
-        </p:nvSpPr>
-        <p:spPr>
-          <a:xfrm>
-            <a:off x="550783" y="375649"/>
-            <a:ext cx="1237917" cy="1461839"/>
-          </a:xfrm>
-          <a:prstGeom prst="rect">
-            <a:avLst/>
-          </a:prstGeom>
-          <a:solidFill>
-            <a:schemeClr val="bg1"/>
-          </a:solidFill>
-          <a:ln>
-            <a:noFill/>
-          </a:ln>
-          <a:effectLst/>
-        </p:spPr>
-        <p:style>
-          <a:lnRef idx="1">
-            <a:schemeClr val="accent1"/>
-          </a:lnRef>
-          <a:fillRef idx="3">
-            <a:schemeClr val="accent1"/>
-          </a:fillRef>
-          <a:effectRef idx="2">
-            <a:schemeClr val="accent1"/>
-          </a:effectRef>
-          <a:fontRef idx="minor">
-            <a:schemeClr val="lt1"/>
-          </a:fontRef>
-        </p:style>
-        <p:txBody>
-          <a:bodyPr rtlCol="0" anchor="ctr"/>
-          <a:lstStyle/>
-          <a:p>
-            <a:pPr algn="ctr"/>
-            <a:endParaRPr lang="en-US" sz="1500">
-              <a:solidFill>
-                <a:schemeClr val="tx1"/>
-              </a:solidFill>
-              <a:latin typeface="Times New Roman"/>
-            </a:endParaRPr>
-          </a:p>
-        </p:txBody>
-      </p:sp>
-      <p:sp>
-        <p:nvSpPr>
-          <p:cNvPr id="15" name="Rectangle 14"/>
-          <p:cNvSpPr/>
-          <p:nvPr/>
-        </p:nvSpPr>
-        <p:spPr>
-          <a:xfrm>
-            <a:off x="1481225" y="1127631"/>
-            <a:ext cx="1684420" cy="458535"/>
-          </a:xfrm>
-          <a:prstGeom prst="rect">
-            <a:avLst/>
-          </a:prstGeom>
-          <a:solidFill>
-            <a:schemeClr val="bg1"/>
-          </a:solidFill>
-          <a:ln>
-            <a:noFill/>
-          </a:ln>
-          <a:effectLst/>
-        </p:spPr>
-        <p:style>
-          <a:lnRef idx="1">
-            <a:schemeClr val="accent1"/>
-          </a:lnRef>
-          <a:fillRef idx="3">
-            <a:schemeClr val="accent1"/>
-          </a:fillRef>
-          <a:effectRef idx="2">
-            <a:schemeClr val="accent1"/>
-          </a:effectRef>
-          <a:fontRef idx="minor">
-            <a:schemeClr val="lt1"/>
-          </a:fontRef>
-        </p:style>
-        <p:txBody>
-          <a:bodyPr rtlCol="0" anchor="ctr"/>
-          <a:lstStyle/>
-          <a:p>
-            <a:pPr algn="ctr"/>
-            <a:r>
-              <a:rPr lang="en-US" sz="1500">
-                <a:solidFill>
-                  <a:schemeClr val="tx1"/>
-                </a:solidFill>
-                <a:latin typeface="Times New Roman"/>
-              </a:rPr>
-              <a:t>Fungal Leaf Pathogens 2010</a:t>
-            </a:r>
-          </a:p>
-        </p:txBody>
-      </p:sp>
       <p:pic>
         <p:nvPicPr>
-          <p:cNvPr id="18" name="Picture 17" descr="Screen shot 2014-07-16 at 11.07.47 AM.png"/>
+          <p:cNvPr id="6" name="Picture 5" descr="netFig2b.pdf"/>
           <p:cNvPicPr>
             <a:picLocks noChangeAspect="1"/>
           </p:cNvPicPr>
@@ -3578,533 +3102,24 @@
         </p:blipFill>
         <p:spPr>
           <a:xfrm>
-            <a:off x="92376" y="126396"/>
-            <a:ext cx="1487169" cy="1717176"/>
+            <a:off x="0" y="4635883"/>
+            <a:ext cx="6858000" cy="4457700"/>
           </a:xfrm>
           <a:prstGeom prst="rect">
             <a:avLst/>
           </a:prstGeom>
-          <a:ln>
-            <a:solidFill>
-              <a:schemeClr val="tx1"/>
-            </a:solidFill>
-          </a:ln>
         </p:spPr>
       </p:pic>
-      <p:sp>
-        <p:nvSpPr>
-          <p:cNvPr id="19" name="Oval 18"/>
-          <p:cNvSpPr/>
-          <p:nvPr/>
-        </p:nvSpPr>
-        <p:spPr>
-          <a:xfrm>
-            <a:off x="5852035" y="1597506"/>
-            <a:ext cx="472565" cy="471234"/>
-          </a:xfrm>
-          <a:prstGeom prst="ellipse">
-            <a:avLst/>
-          </a:prstGeom>
-          <a:solidFill>
-            <a:srgbClr val="813D05"/>
-          </a:solidFill>
-          <a:ln w="3175" cmpd="sng">
-            <a:solidFill>
-              <a:schemeClr val="bg1"/>
-            </a:solidFill>
-          </a:ln>
-          <a:effectLst/>
-        </p:spPr>
-        <p:style>
-          <a:lnRef idx="1">
-            <a:schemeClr val="accent1"/>
-          </a:lnRef>
-          <a:fillRef idx="3">
-            <a:schemeClr val="accent1"/>
-          </a:fillRef>
-          <a:effectRef idx="2">
-            <a:schemeClr val="accent1"/>
-          </a:effectRef>
-          <a:fontRef idx="minor">
-            <a:schemeClr val="lt1"/>
-          </a:fontRef>
-        </p:style>
-        <p:txBody>
-          <a:bodyPr rtlCol="0" anchor="ctr"/>
-          <a:lstStyle/>
-          <a:p>
-            <a:pPr algn="ctr"/>
-            <a:endParaRPr lang="en-US"/>
-          </a:p>
-        </p:txBody>
-      </p:sp>
-      <p:sp>
-        <p:nvSpPr>
-          <p:cNvPr id="20" name="Oval 19"/>
-          <p:cNvSpPr/>
-          <p:nvPr/>
-        </p:nvSpPr>
-        <p:spPr>
-          <a:xfrm>
-            <a:off x="6477000" y="3211165"/>
-            <a:ext cx="472565" cy="471234"/>
-          </a:xfrm>
-          <a:prstGeom prst="ellipse">
-            <a:avLst/>
-          </a:prstGeom>
-          <a:solidFill>
-            <a:srgbClr val="813D05"/>
-          </a:solidFill>
-          <a:ln w="3175" cmpd="sng">
-            <a:solidFill>
-              <a:schemeClr val="bg1"/>
-            </a:solidFill>
-          </a:ln>
-          <a:effectLst/>
-        </p:spPr>
-        <p:style>
-          <a:lnRef idx="1">
-            <a:schemeClr val="accent1"/>
-          </a:lnRef>
-          <a:fillRef idx="3">
-            <a:schemeClr val="accent1"/>
-          </a:fillRef>
-          <a:effectRef idx="2">
-            <a:schemeClr val="accent1"/>
-          </a:effectRef>
-          <a:fontRef idx="minor">
-            <a:schemeClr val="lt1"/>
-          </a:fontRef>
-        </p:style>
-        <p:txBody>
-          <a:bodyPr rtlCol="0" anchor="ctr"/>
-          <a:lstStyle/>
-          <a:p>
-            <a:pPr algn="ctr"/>
-            <a:endParaRPr lang="en-US"/>
-          </a:p>
-        </p:txBody>
-      </p:sp>
-      <p:sp>
-        <p:nvSpPr>
-          <p:cNvPr id="21" name="Oval 20"/>
-          <p:cNvSpPr/>
-          <p:nvPr/>
-        </p:nvSpPr>
-        <p:spPr>
-          <a:xfrm>
-            <a:off x="5919794" y="4636243"/>
-            <a:ext cx="472565" cy="471234"/>
-          </a:xfrm>
-          <a:prstGeom prst="ellipse">
-            <a:avLst/>
-          </a:prstGeom>
-          <a:solidFill>
-            <a:srgbClr val="813D05"/>
-          </a:solidFill>
-          <a:ln w="3175" cmpd="sng">
-            <a:solidFill>
-              <a:schemeClr val="bg1"/>
-            </a:solidFill>
-          </a:ln>
-          <a:effectLst/>
-        </p:spPr>
-        <p:style>
-          <a:lnRef idx="1">
-            <a:schemeClr val="accent1"/>
-          </a:lnRef>
-          <a:fillRef idx="3">
-            <a:schemeClr val="accent1"/>
-          </a:fillRef>
-          <a:effectRef idx="2">
-            <a:schemeClr val="accent1"/>
-          </a:effectRef>
-          <a:fontRef idx="minor">
-            <a:schemeClr val="lt1"/>
-          </a:fontRef>
-        </p:style>
-        <p:txBody>
-          <a:bodyPr rtlCol="0" anchor="ctr"/>
-          <a:lstStyle/>
-          <a:p>
-            <a:pPr algn="ctr"/>
-            <a:endParaRPr lang="en-US"/>
-          </a:p>
-        </p:txBody>
-      </p:sp>
-      <p:sp>
-        <p:nvSpPr>
-          <p:cNvPr id="22" name="Oval 21"/>
-          <p:cNvSpPr/>
-          <p:nvPr/>
-        </p:nvSpPr>
-        <p:spPr>
-          <a:xfrm>
-            <a:off x="135923" y="1637820"/>
-            <a:ext cx="115267" cy="112973"/>
-          </a:xfrm>
-          <a:prstGeom prst="ellipse">
-            <a:avLst/>
-          </a:prstGeom>
-          <a:solidFill>
-            <a:srgbClr val="813D05"/>
-          </a:solidFill>
-          <a:ln w="3175" cmpd="sng">
-            <a:solidFill>
-              <a:schemeClr val="bg1"/>
-            </a:solidFill>
-          </a:ln>
-          <a:effectLst/>
-        </p:spPr>
-        <p:style>
-          <a:lnRef idx="1">
-            <a:schemeClr val="accent1"/>
-          </a:lnRef>
-          <a:fillRef idx="3">
-            <a:schemeClr val="accent1"/>
-          </a:fillRef>
-          <a:effectRef idx="2">
-            <a:schemeClr val="accent1"/>
-          </a:effectRef>
-          <a:fontRef idx="minor">
-            <a:schemeClr val="lt1"/>
-          </a:fontRef>
-        </p:style>
-        <p:txBody>
-          <a:bodyPr rtlCol="0" anchor="ctr"/>
-          <a:lstStyle/>
-          <a:p>
-            <a:pPr algn="ctr"/>
-            <a:endParaRPr lang="en-US"/>
-          </a:p>
-        </p:txBody>
-      </p:sp>
-      <p:sp>
-        <p:nvSpPr>
-          <p:cNvPr id="17" name="Oval 16"/>
-          <p:cNvSpPr/>
-          <p:nvPr/>
-        </p:nvSpPr>
-        <p:spPr>
-          <a:xfrm>
-            <a:off x="3074925" y="1563486"/>
-            <a:ext cx="472565" cy="471234"/>
-          </a:xfrm>
-          <a:prstGeom prst="ellipse">
-            <a:avLst/>
-          </a:prstGeom>
-          <a:solidFill>
-            <a:srgbClr val="008000"/>
-          </a:solidFill>
-          <a:ln w="3175" cmpd="sng">
-            <a:solidFill>
-              <a:schemeClr val="bg1"/>
-            </a:solidFill>
-          </a:ln>
-          <a:effectLst/>
-        </p:spPr>
-        <p:style>
-          <a:lnRef idx="1">
-            <a:schemeClr val="accent1"/>
-          </a:lnRef>
-          <a:fillRef idx="3">
-            <a:schemeClr val="accent1"/>
-          </a:fillRef>
-          <a:effectRef idx="2">
-            <a:schemeClr val="accent1"/>
-          </a:effectRef>
-          <a:fontRef idx="minor">
-            <a:schemeClr val="lt1"/>
-          </a:fontRef>
-        </p:style>
-        <p:txBody>
-          <a:bodyPr rtlCol="0" anchor="ctr"/>
-          <a:lstStyle/>
-          <a:p>
-            <a:pPr algn="ctr"/>
-            <a:endParaRPr lang="en-US"/>
-          </a:p>
-        </p:txBody>
-      </p:sp>
-      <p:sp>
-        <p:nvSpPr>
-          <p:cNvPr id="23" name="Oval 22"/>
-          <p:cNvSpPr/>
-          <p:nvPr/>
-        </p:nvSpPr>
-        <p:spPr>
-          <a:xfrm>
-            <a:off x="2467302" y="3131593"/>
-            <a:ext cx="472565" cy="471234"/>
-          </a:xfrm>
-          <a:prstGeom prst="ellipse">
-            <a:avLst/>
-          </a:prstGeom>
-          <a:solidFill>
-            <a:srgbClr val="008000"/>
-          </a:solidFill>
-          <a:ln w="3175" cmpd="sng">
-            <a:solidFill>
-              <a:schemeClr val="bg1"/>
-            </a:solidFill>
-          </a:ln>
-          <a:effectLst/>
-        </p:spPr>
-        <p:style>
-          <a:lnRef idx="1">
-            <a:schemeClr val="accent1"/>
-          </a:lnRef>
-          <a:fillRef idx="3">
-            <a:schemeClr val="accent1"/>
-          </a:fillRef>
-          <a:effectRef idx="2">
-            <a:schemeClr val="accent1"/>
-          </a:effectRef>
-          <a:fontRef idx="minor">
-            <a:schemeClr val="lt1"/>
-          </a:fontRef>
-        </p:style>
-        <p:txBody>
-          <a:bodyPr rtlCol="0" anchor="ctr"/>
-          <a:lstStyle/>
-          <a:p>
-            <a:pPr algn="ctr"/>
-            <a:endParaRPr lang="en-US"/>
-          </a:p>
-        </p:txBody>
-      </p:sp>
-      <p:sp>
-        <p:nvSpPr>
-          <p:cNvPr id="24" name="Oval 23"/>
-          <p:cNvSpPr/>
-          <p:nvPr/>
-        </p:nvSpPr>
-        <p:spPr>
-          <a:xfrm>
-            <a:off x="2901344" y="4509939"/>
-            <a:ext cx="472565" cy="471234"/>
-          </a:xfrm>
-          <a:prstGeom prst="ellipse">
-            <a:avLst/>
-          </a:prstGeom>
-          <a:solidFill>
-            <a:srgbClr val="008000"/>
-          </a:solidFill>
-          <a:ln w="3175" cmpd="sng">
-            <a:solidFill>
-              <a:schemeClr val="bg1"/>
-            </a:solidFill>
-          </a:ln>
-          <a:effectLst/>
-        </p:spPr>
-        <p:style>
-          <a:lnRef idx="1">
-            <a:schemeClr val="accent1"/>
-          </a:lnRef>
-          <a:fillRef idx="3">
-            <a:schemeClr val="accent1"/>
-          </a:fillRef>
-          <a:effectRef idx="2">
-            <a:schemeClr val="accent1"/>
-          </a:effectRef>
-          <a:fontRef idx="minor">
-            <a:schemeClr val="lt1"/>
-          </a:fontRef>
-        </p:style>
-        <p:txBody>
-          <a:bodyPr rtlCol="0" anchor="ctr"/>
-          <a:lstStyle/>
-          <a:p>
-            <a:pPr algn="ctr"/>
-            <a:endParaRPr lang="en-US"/>
-          </a:p>
-        </p:txBody>
-      </p:sp>
-      <p:sp>
-        <p:nvSpPr>
-          <p:cNvPr id="25" name="Oval 24"/>
-          <p:cNvSpPr/>
-          <p:nvPr/>
-        </p:nvSpPr>
-        <p:spPr>
-          <a:xfrm>
-            <a:off x="4539238" y="5246373"/>
-            <a:ext cx="472565" cy="471234"/>
-          </a:xfrm>
-          <a:prstGeom prst="ellipse">
-            <a:avLst/>
-          </a:prstGeom>
-          <a:solidFill>
-            <a:srgbClr val="008000"/>
-          </a:solidFill>
-          <a:ln w="3175" cmpd="sng">
-            <a:solidFill>
-              <a:schemeClr val="bg1"/>
-            </a:solidFill>
-          </a:ln>
-          <a:effectLst/>
-        </p:spPr>
-        <p:style>
-          <a:lnRef idx="1">
-            <a:schemeClr val="accent1"/>
-          </a:lnRef>
-          <a:fillRef idx="3">
-            <a:schemeClr val="accent1"/>
-          </a:fillRef>
-          <a:effectRef idx="2">
-            <a:schemeClr val="accent1"/>
-          </a:effectRef>
-          <a:fontRef idx="minor">
-            <a:schemeClr val="lt1"/>
-          </a:fontRef>
-        </p:style>
-        <p:txBody>
-          <a:bodyPr rtlCol="0" anchor="ctr"/>
-          <a:lstStyle/>
-          <a:p>
-            <a:pPr algn="ctr"/>
-            <a:endParaRPr lang="en-US"/>
-          </a:p>
-        </p:txBody>
-      </p:sp>
-      <p:sp>
-        <p:nvSpPr>
-          <p:cNvPr id="26" name="Oval 25"/>
-          <p:cNvSpPr/>
-          <p:nvPr/>
-        </p:nvSpPr>
-        <p:spPr>
-          <a:xfrm>
-            <a:off x="129563" y="1143840"/>
-            <a:ext cx="115267" cy="112973"/>
-          </a:xfrm>
-          <a:prstGeom prst="ellipse">
-            <a:avLst/>
-          </a:prstGeom>
-          <a:solidFill>
-            <a:srgbClr val="008000"/>
-          </a:solidFill>
-          <a:ln w="3175" cmpd="sng">
-            <a:solidFill>
-              <a:schemeClr val="bg1"/>
-            </a:solidFill>
-          </a:ln>
-          <a:effectLst/>
-        </p:spPr>
-        <p:style>
-          <a:lnRef idx="1">
-            <a:schemeClr val="accent1"/>
-          </a:lnRef>
-          <a:fillRef idx="3">
-            <a:schemeClr val="accent1"/>
-          </a:fillRef>
-          <a:effectRef idx="2">
-            <a:schemeClr val="accent1"/>
-          </a:effectRef>
-          <a:fontRef idx="minor">
-            <a:schemeClr val="lt1"/>
-          </a:fontRef>
-        </p:style>
-        <p:txBody>
-          <a:bodyPr rtlCol="0" anchor="ctr"/>
-          <a:lstStyle/>
-          <a:p>
-            <a:pPr algn="ctr"/>
-            <a:endParaRPr lang="en-US"/>
-          </a:p>
-        </p:txBody>
-      </p:sp>
-      <p:sp>
-        <p:nvSpPr>
-          <p:cNvPr id="27" name="Oval 26"/>
-          <p:cNvSpPr/>
-          <p:nvPr/>
-        </p:nvSpPr>
-        <p:spPr>
-          <a:xfrm>
-            <a:off x="134543" y="1398300"/>
-            <a:ext cx="115267" cy="112973"/>
-          </a:xfrm>
-          <a:prstGeom prst="ellipse">
-            <a:avLst/>
-          </a:prstGeom>
-          <a:solidFill>
-            <a:schemeClr val="tx1">
-              <a:lumMod val="65000"/>
-              <a:lumOff val="35000"/>
-            </a:schemeClr>
-          </a:solidFill>
-          <a:ln w="3175" cmpd="sng">
-            <a:solidFill>
-              <a:schemeClr val="bg1"/>
-            </a:solidFill>
-          </a:ln>
-          <a:effectLst/>
-        </p:spPr>
-        <p:style>
-          <a:lnRef idx="1">
-            <a:schemeClr val="accent1"/>
-          </a:lnRef>
-          <a:fillRef idx="3">
-            <a:schemeClr val="accent1"/>
-          </a:fillRef>
-          <a:effectRef idx="2">
-            <a:schemeClr val="accent1"/>
-          </a:effectRef>
-          <a:fontRef idx="minor">
-            <a:schemeClr val="lt1"/>
-          </a:fontRef>
-        </p:style>
-        <p:txBody>
-          <a:bodyPr rtlCol="0" anchor="ctr"/>
-          <a:lstStyle/>
-          <a:p>
-            <a:pPr algn="ctr"/>
-            <a:endParaRPr lang="en-US"/>
-          </a:p>
-        </p:txBody>
-      </p:sp>
-    </p:spTree>
-    <p:extLst>
-      <p:ext uri="{BB962C8B-B14F-4D97-AF65-F5344CB8AC3E}">
-        <p14:creationId xmlns:p14="http://schemas.microsoft.com/office/powerpoint/2010/main" val="2584212949"/>
-      </p:ext>
-    </p:extLst>
-  </p:cSld>
-  <p:clrMapOvr>
-    <a:masterClrMapping/>
-  </p:clrMapOvr>
-</p:sld>
-</file>
-
-<file path=ppt/slides/slide2.xml><?xml version="1.0" encoding="utf-8"?>
-<p:sld xmlns:a="http://schemas.openxmlformats.org/drawingml/2006/main" xmlns:r="http://schemas.openxmlformats.org/officeDocument/2006/relationships" xmlns:p="http://schemas.openxmlformats.org/presentationml/2006/main">
-  <p:cSld>
-    <p:spTree>
-      <p:nvGrpSpPr>
-        <p:cNvPr id="1" name=""/>
-        <p:cNvGrpSpPr/>
-        <p:nvPr/>
-      </p:nvGrpSpPr>
-      <p:grpSpPr>
-        <a:xfrm>
-          <a:off x="0" y="0"/>
-          <a:ext cx="0" cy="0"/>
-          <a:chOff x="0" y="0"/>
-          <a:chExt cx="0" cy="0"/>
-        </a:xfrm>
-      </p:grpSpPr>
       <p:pic>
         <p:nvPicPr>
-          <p:cNvPr id="2" name="Picture 1" descr="Rplot2.pdf"/>
+          <p:cNvPr id="7" name="Picture 6" descr="netFig2L.pdf"/>
           <p:cNvPicPr>
             <a:picLocks noChangeAspect="1"/>
           </p:cNvPicPr>
           <p:nvPr/>
         </p:nvPicPr>
         <p:blipFill>
-          <a:blip r:embed="rId2">
-            <a:lum bright="-18000"/>
+          <a:blip r:embed="rId4">
             <a:extLst>
               <a:ext uri="{28A0092B-C50C-407E-A947-70E740481C1C}">
                 <a14:useLocalDpi xmlns:a14="http://schemas.microsoft.com/office/drawing/2010/main" val="0"/>
@@ -4117,771 +3132,18 @@
         </p:blipFill>
         <p:spPr>
           <a:xfrm>
-            <a:off x="265171" y="0"/>
-            <a:ext cx="8598090" cy="6858000"/>
+            <a:off x="5080419" y="3580541"/>
+            <a:ext cx="2245364" cy="2245364"/>
           </a:xfrm>
           <a:prstGeom prst="rect">
             <a:avLst/>
           </a:prstGeom>
         </p:spPr>
       </p:pic>
-      <p:sp>
-        <p:nvSpPr>
-          <p:cNvPr id="3" name="Rectangle 2"/>
-          <p:cNvSpPr/>
-          <p:nvPr/>
-        </p:nvSpPr>
-        <p:spPr>
-          <a:xfrm>
-            <a:off x="4023887" y="594893"/>
-            <a:ext cx="1524000" cy="307474"/>
-          </a:xfrm>
-          <a:prstGeom prst="rect">
-            <a:avLst/>
-          </a:prstGeom>
-          <a:solidFill>
-            <a:schemeClr val="bg1"/>
-          </a:solidFill>
-          <a:ln>
-            <a:noFill/>
-          </a:ln>
-          <a:effectLst/>
-        </p:spPr>
-        <p:style>
-          <a:lnRef idx="1">
-            <a:schemeClr val="accent1"/>
-          </a:lnRef>
-          <a:fillRef idx="3">
-            <a:schemeClr val="accent1"/>
-          </a:fillRef>
-          <a:effectRef idx="2">
-            <a:schemeClr val="accent1"/>
-          </a:effectRef>
-          <a:fontRef idx="minor">
-            <a:schemeClr val="lt1"/>
-          </a:fontRef>
-        </p:style>
-        <p:txBody>
-          <a:bodyPr rtlCol="0" anchor="ctr"/>
-          <a:lstStyle/>
-          <a:p>
-            <a:pPr algn="ctr"/>
-            <a:r>
-              <a:rPr lang="en-US" sz="1500">
-                <a:solidFill>
-                  <a:schemeClr val="tx1"/>
-                </a:solidFill>
-                <a:latin typeface="Times New Roman"/>
-              </a:rPr>
-              <a:t>Lichen 2010</a:t>
-            </a:r>
-          </a:p>
-        </p:txBody>
-      </p:sp>
-      <p:sp>
-        <p:nvSpPr>
-          <p:cNvPr id="4" name="Rectangle 3"/>
-          <p:cNvSpPr/>
-          <p:nvPr/>
-        </p:nvSpPr>
-        <p:spPr>
-          <a:xfrm>
-            <a:off x="6164178" y="1074159"/>
-            <a:ext cx="1455826" cy="522706"/>
-          </a:xfrm>
-          <a:prstGeom prst="rect">
-            <a:avLst/>
-          </a:prstGeom>
-          <a:solidFill>
-            <a:schemeClr val="bg1"/>
-          </a:solidFill>
-          <a:ln>
-            <a:noFill/>
-          </a:ln>
-          <a:effectLst/>
-        </p:spPr>
-        <p:style>
-          <a:lnRef idx="1">
-            <a:schemeClr val="accent1"/>
-          </a:lnRef>
-          <a:fillRef idx="3">
-            <a:schemeClr val="accent1"/>
-          </a:fillRef>
-          <a:effectRef idx="2">
-            <a:schemeClr val="accent1"/>
-          </a:effectRef>
-          <a:fontRef idx="minor">
-            <a:schemeClr val="lt1"/>
-          </a:fontRef>
-        </p:style>
-        <p:txBody>
-          <a:bodyPr rtlCol="0" anchor="ctr"/>
-          <a:lstStyle/>
-          <a:p>
-            <a:pPr algn="ctr"/>
-            <a:r>
-              <a:rPr lang="en-US" sz="1500">
-                <a:solidFill>
-                  <a:schemeClr val="tx1"/>
-                </a:solidFill>
-                <a:latin typeface="Times New Roman"/>
-              </a:rPr>
-              <a:t>Ectomycorrhizal Fungi 2006</a:t>
-            </a:r>
-          </a:p>
-        </p:txBody>
-      </p:sp>
-      <p:sp>
-        <p:nvSpPr>
-          <p:cNvPr id="5" name="Rectangle 4"/>
-          <p:cNvSpPr/>
-          <p:nvPr/>
-        </p:nvSpPr>
-        <p:spPr>
-          <a:xfrm>
-            <a:off x="6978314" y="3172326"/>
-            <a:ext cx="1323469" cy="530730"/>
-          </a:xfrm>
-          <a:prstGeom prst="rect">
-            <a:avLst/>
-          </a:prstGeom>
-          <a:solidFill>
-            <a:schemeClr val="bg1"/>
-          </a:solidFill>
-          <a:ln>
-            <a:noFill/>
-          </a:ln>
-          <a:effectLst/>
-        </p:spPr>
-        <p:style>
-          <a:lnRef idx="1">
-            <a:schemeClr val="accent1"/>
-          </a:lnRef>
-          <a:fillRef idx="3">
-            <a:schemeClr val="accent1"/>
-          </a:fillRef>
-          <a:effectRef idx="2">
-            <a:schemeClr val="accent1"/>
-          </a:effectRef>
-          <a:fontRef idx="minor">
-            <a:schemeClr val="lt1"/>
-          </a:fontRef>
-        </p:style>
-        <p:txBody>
-          <a:bodyPr rtlCol="0" anchor="ctr"/>
-          <a:lstStyle/>
-          <a:p>
-            <a:pPr algn="ctr"/>
-            <a:r>
-              <a:rPr lang="en-US" sz="1500">
-                <a:solidFill>
-                  <a:schemeClr val="tx1"/>
-                </a:solidFill>
-                <a:latin typeface="Times New Roman"/>
-              </a:rPr>
-              <a:t>Soil Bacteria 2004</a:t>
-            </a:r>
-          </a:p>
-        </p:txBody>
-      </p:sp>
-      <p:sp>
-        <p:nvSpPr>
-          <p:cNvPr id="6" name="Rectangle 5"/>
-          <p:cNvSpPr/>
-          <p:nvPr/>
-        </p:nvSpPr>
-        <p:spPr>
-          <a:xfrm>
-            <a:off x="6137442" y="5128129"/>
-            <a:ext cx="1237917" cy="406397"/>
-          </a:xfrm>
-          <a:prstGeom prst="rect">
-            <a:avLst/>
-          </a:prstGeom>
-          <a:solidFill>
-            <a:schemeClr val="bg1"/>
-          </a:solidFill>
-          <a:ln>
-            <a:noFill/>
-          </a:ln>
-          <a:effectLst/>
-        </p:spPr>
-        <p:style>
-          <a:lnRef idx="1">
-            <a:schemeClr val="accent1"/>
-          </a:lnRef>
-          <a:fillRef idx="3">
-            <a:schemeClr val="accent1"/>
-          </a:fillRef>
-          <a:effectRef idx="2">
-            <a:schemeClr val="accent1"/>
-          </a:effectRef>
-          <a:fontRef idx="minor">
-            <a:schemeClr val="lt1"/>
-          </a:fontRef>
-        </p:style>
-        <p:txBody>
-          <a:bodyPr rtlCol="0" anchor="ctr"/>
-          <a:lstStyle/>
-          <a:p>
-            <a:pPr algn="ctr"/>
-            <a:r>
-              <a:rPr lang="en-US" sz="1500">
-                <a:solidFill>
-                  <a:schemeClr val="tx1"/>
-                </a:solidFill>
-                <a:latin typeface="Times New Roman"/>
-              </a:rPr>
-              <a:t>Soil Fungi 2004</a:t>
-            </a:r>
-          </a:p>
-        </p:txBody>
-      </p:sp>
-      <p:sp>
-        <p:nvSpPr>
-          <p:cNvPr id="7" name="Rectangle 6"/>
-          <p:cNvSpPr/>
-          <p:nvPr/>
-        </p:nvSpPr>
-        <p:spPr>
-          <a:xfrm>
-            <a:off x="4029242" y="5819280"/>
-            <a:ext cx="1545390" cy="423773"/>
-          </a:xfrm>
-          <a:prstGeom prst="rect">
-            <a:avLst/>
-          </a:prstGeom>
-          <a:solidFill>
-            <a:schemeClr val="bg1"/>
-          </a:solidFill>
-          <a:ln>
-            <a:noFill/>
-          </a:ln>
-          <a:effectLst/>
-        </p:spPr>
-        <p:style>
-          <a:lnRef idx="1">
-            <a:schemeClr val="accent1"/>
-          </a:lnRef>
-          <a:fillRef idx="3">
-            <a:schemeClr val="accent1"/>
-          </a:fillRef>
-          <a:effectRef idx="2">
-            <a:schemeClr val="accent1"/>
-          </a:effectRef>
-          <a:fontRef idx="minor">
-            <a:schemeClr val="lt1"/>
-          </a:fontRef>
-        </p:style>
-        <p:txBody>
-          <a:bodyPr rtlCol="0" anchor="ctr"/>
-          <a:lstStyle/>
-          <a:p>
-            <a:pPr algn="ctr"/>
-            <a:r>
-              <a:rPr lang="en-US" sz="1500">
-                <a:solidFill>
-                  <a:schemeClr val="tx1"/>
-                </a:solidFill>
-                <a:latin typeface="Times New Roman"/>
-              </a:rPr>
-              <a:t>Twig Endophyes 2006</a:t>
-            </a:r>
-          </a:p>
-        </p:txBody>
-      </p:sp>
-      <p:sp>
-        <p:nvSpPr>
-          <p:cNvPr id="8" name="Rectangle 7"/>
-          <p:cNvSpPr/>
-          <p:nvPr/>
-        </p:nvSpPr>
-        <p:spPr>
-          <a:xfrm>
-            <a:off x="1521324" y="5013165"/>
-            <a:ext cx="1526676" cy="481269"/>
-          </a:xfrm>
-          <a:prstGeom prst="rect">
-            <a:avLst/>
-          </a:prstGeom>
-          <a:solidFill>
-            <a:schemeClr val="bg1"/>
-          </a:solidFill>
-          <a:ln>
-            <a:noFill/>
-          </a:ln>
-          <a:effectLst/>
-        </p:spPr>
-        <p:style>
-          <a:lnRef idx="1">
-            <a:schemeClr val="accent1"/>
-          </a:lnRef>
-          <a:fillRef idx="3">
-            <a:schemeClr val="accent1"/>
-          </a:fillRef>
-          <a:effectRef idx="2">
-            <a:schemeClr val="accent1"/>
-          </a:effectRef>
-          <a:fontRef idx="minor">
-            <a:schemeClr val="lt1"/>
-          </a:fontRef>
-        </p:style>
-        <p:txBody>
-          <a:bodyPr rtlCol="0" anchor="ctr"/>
-          <a:lstStyle/>
-          <a:p>
-            <a:pPr algn="ctr"/>
-            <a:r>
-              <a:rPr lang="en-US" sz="1500">
-                <a:solidFill>
-                  <a:schemeClr val="tx1"/>
-                </a:solidFill>
-                <a:latin typeface="Times New Roman"/>
-              </a:rPr>
-              <a:t>Leaf Modifying Arthropods 2010</a:t>
-            </a:r>
-          </a:p>
-        </p:txBody>
-      </p:sp>
-      <p:sp>
-        <p:nvSpPr>
-          <p:cNvPr id="9" name="Rectangle 8"/>
-          <p:cNvSpPr/>
-          <p:nvPr/>
-        </p:nvSpPr>
-        <p:spPr>
-          <a:xfrm>
-            <a:off x="939797" y="3070072"/>
-            <a:ext cx="1493249" cy="651040"/>
-          </a:xfrm>
-          <a:prstGeom prst="rect">
-            <a:avLst/>
-          </a:prstGeom>
-          <a:solidFill>
-            <a:schemeClr val="bg1"/>
-          </a:solidFill>
-          <a:ln>
-            <a:noFill/>
-          </a:ln>
-          <a:effectLst/>
-        </p:spPr>
-        <p:style>
-          <a:lnRef idx="1">
-            <a:schemeClr val="accent1"/>
-          </a:lnRef>
-          <a:fillRef idx="3">
-            <a:schemeClr val="accent1"/>
-          </a:fillRef>
-          <a:effectRef idx="2">
-            <a:schemeClr val="accent1"/>
-          </a:effectRef>
-          <a:fontRef idx="minor">
-            <a:schemeClr val="lt1"/>
-          </a:fontRef>
-        </p:style>
-        <p:txBody>
-          <a:bodyPr rtlCol="0" anchor="ctr"/>
-          <a:lstStyle/>
-          <a:p>
-            <a:pPr algn="ctr"/>
-            <a:r>
-              <a:rPr lang="en-US" sz="1500">
-                <a:solidFill>
-                  <a:schemeClr val="tx1"/>
-                </a:solidFill>
-                <a:latin typeface="Times New Roman"/>
-              </a:rPr>
-              <a:t>Fungal Leaf Pathogens 2009</a:t>
-            </a:r>
-          </a:p>
-        </p:txBody>
-      </p:sp>
-      <p:sp>
-        <p:nvSpPr>
-          <p:cNvPr id="10" name="Rectangle 9"/>
-          <p:cNvSpPr/>
-          <p:nvPr/>
-        </p:nvSpPr>
-        <p:spPr>
-          <a:xfrm>
-            <a:off x="1588158" y="1127631"/>
-            <a:ext cx="1499946" cy="458535"/>
-          </a:xfrm>
-          <a:prstGeom prst="rect">
-            <a:avLst/>
-          </a:prstGeom>
-          <a:solidFill>
-            <a:schemeClr val="bg1"/>
-          </a:solidFill>
-          <a:ln>
-            <a:noFill/>
-          </a:ln>
-          <a:effectLst/>
-        </p:spPr>
-        <p:style>
-          <a:lnRef idx="1">
-            <a:schemeClr val="accent1"/>
-          </a:lnRef>
-          <a:fillRef idx="3">
-            <a:schemeClr val="accent1"/>
-          </a:fillRef>
-          <a:effectRef idx="2">
-            <a:schemeClr val="accent1"/>
-          </a:effectRef>
-          <a:fontRef idx="minor">
-            <a:schemeClr val="lt1"/>
-          </a:fontRef>
-        </p:style>
-        <p:txBody>
-          <a:bodyPr rtlCol="0" anchor="ctr"/>
-          <a:lstStyle/>
-          <a:p>
-            <a:pPr algn="ctr"/>
-            <a:r>
-              <a:rPr lang="en-US" sz="1500">
-                <a:solidFill>
-                  <a:schemeClr val="tx1"/>
-                </a:solidFill>
-                <a:latin typeface="Times New Roman"/>
-              </a:rPr>
-              <a:t>Fungal Leaf Pathogens 2010</a:t>
-            </a:r>
-          </a:p>
-        </p:txBody>
-      </p:sp>
-      <p:sp>
-        <p:nvSpPr>
-          <p:cNvPr id="11" name="Oval 10"/>
-          <p:cNvSpPr/>
-          <p:nvPr/>
-        </p:nvSpPr>
-        <p:spPr>
-          <a:xfrm>
-            <a:off x="5919794" y="4636243"/>
-            <a:ext cx="472565" cy="471234"/>
-          </a:xfrm>
-          <a:prstGeom prst="ellipse">
-            <a:avLst/>
-          </a:prstGeom>
-          <a:solidFill>
-            <a:srgbClr val="813D05"/>
-          </a:solidFill>
-          <a:ln w="3175" cmpd="sng">
-            <a:solidFill>
-              <a:schemeClr val="bg1"/>
-            </a:solidFill>
-          </a:ln>
-          <a:effectLst/>
-        </p:spPr>
-        <p:style>
-          <a:lnRef idx="1">
-            <a:schemeClr val="accent1"/>
-          </a:lnRef>
-          <a:fillRef idx="3">
-            <a:schemeClr val="accent1"/>
-          </a:fillRef>
-          <a:effectRef idx="2">
-            <a:schemeClr val="accent1"/>
-          </a:effectRef>
-          <a:fontRef idx="minor">
-            <a:schemeClr val="lt1"/>
-          </a:fontRef>
-        </p:style>
-        <p:txBody>
-          <a:bodyPr rtlCol="0" anchor="ctr"/>
-          <a:lstStyle/>
-          <a:p>
-            <a:pPr algn="ctr"/>
-            <a:endParaRPr lang="en-US"/>
-          </a:p>
-        </p:txBody>
-      </p:sp>
-      <p:sp>
-        <p:nvSpPr>
-          <p:cNvPr id="12" name="Oval 11"/>
-          <p:cNvSpPr/>
-          <p:nvPr/>
-        </p:nvSpPr>
-        <p:spPr>
-          <a:xfrm>
-            <a:off x="6483069" y="3216644"/>
-            <a:ext cx="472565" cy="471234"/>
-          </a:xfrm>
-          <a:prstGeom prst="ellipse">
-            <a:avLst/>
-          </a:prstGeom>
-          <a:solidFill>
-            <a:srgbClr val="813D05"/>
-          </a:solidFill>
-          <a:ln w="3175" cmpd="sng">
-            <a:solidFill>
-              <a:schemeClr val="bg1"/>
-            </a:solidFill>
-          </a:ln>
-          <a:effectLst/>
-        </p:spPr>
-        <p:style>
-          <a:lnRef idx="1">
-            <a:schemeClr val="accent1"/>
-          </a:lnRef>
-          <a:fillRef idx="3">
-            <a:schemeClr val="accent1"/>
-          </a:fillRef>
-          <a:effectRef idx="2">
-            <a:schemeClr val="accent1"/>
-          </a:effectRef>
-          <a:fontRef idx="minor">
-            <a:schemeClr val="lt1"/>
-          </a:fontRef>
-        </p:style>
-        <p:txBody>
-          <a:bodyPr rtlCol="0" anchor="ctr"/>
-          <a:lstStyle/>
-          <a:p>
-            <a:pPr algn="ctr"/>
-            <a:endParaRPr lang="en-US"/>
-          </a:p>
-        </p:txBody>
-      </p:sp>
-      <p:sp>
-        <p:nvSpPr>
-          <p:cNvPr id="13" name="Oval 12"/>
-          <p:cNvSpPr/>
-          <p:nvPr/>
-        </p:nvSpPr>
-        <p:spPr>
-          <a:xfrm>
-            <a:off x="5847251" y="1599213"/>
-            <a:ext cx="472565" cy="471234"/>
-          </a:xfrm>
-          <a:prstGeom prst="ellipse">
-            <a:avLst/>
-          </a:prstGeom>
-          <a:solidFill>
-            <a:srgbClr val="813D05"/>
-          </a:solidFill>
-          <a:ln w="3175" cmpd="sng">
-            <a:solidFill>
-              <a:schemeClr val="bg1"/>
-            </a:solidFill>
-          </a:ln>
-          <a:effectLst/>
-        </p:spPr>
-        <p:style>
-          <a:lnRef idx="1">
-            <a:schemeClr val="accent1"/>
-          </a:lnRef>
-          <a:fillRef idx="3">
-            <a:schemeClr val="accent1"/>
-          </a:fillRef>
-          <a:effectRef idx="2">
-            <a:schemeClr val="accent1"/>
-          </a:effectRef>
-          <a:fontRef idx="minor">
-            <a:schemeClr val="lt1"/>
-          </a:fontRef>
-        </p:style>
-        <p:txBody>
-          <a:bodyPr rtlCol="0" anchor="ctr"/>
-          <a:lstStyle/>
-          <a:p>
-            <a:pPr algn="ctr"/>
-            <a:endParaRPr lang="en-US"/>
-          </a:p>
-        </p:txBody>
-      </p:sp>
-      <p:sp>
-        <p:nvSpPr>
-          <p:cNvPr id="14" name="Oval 13"/>
-          <p:cNvSpPr/>
-          <p:nvPr/>
-        </p:nvSpPr>
-        <p:spPr>
-          <a:xfrm>
-            <a:off x="3086265" y="1574826"/>
-            <a:ext cx="472565" cy="471234"/>
-          </a:xfrm>
-          <a:prstGeom prst="ellipse">
-            <a:avLst/>
-          </a:prstGeom>
-          <a:solidFill>
-            <a:srgbClr val="008000"/>
-          </a:solidFill>
-          <a:ln w="3175" cmpd="sng">
-            <a:solidFill>
-              <a:schemeClr val="bg1"/>
-            </a:solidFill>
-          </a:ln>
-          <a:effectLst/>
-        </p:spPr>
-        <p:style>
-          <a:lnRef idx="1">
-            <a:schemeClr val="accent1"/>
-          </a:lnRef>
-          <a:fillRef idx="3">
-            <a:schemeClr val="accent1"/>
-          </a:fillRef>
-          <a:effectRef idx="2">
-            <a:schemeClr val="accent1"/>
-          </a:effectRef>
-          <a:fontRef idx="minor">
-            <a:schemeClr val="lt1"/>
-          </a:fontRef>
-        </p:style>
-        <p:txBody>
-          <a:bodyPr rtlCol="0" anchor="ctr"/>
-          <a:lstStyle/>
-          <a:p>
-            <a:pPr algn="ctr"/>
-            <a:endParaRPr lang="en-US"/>
-          </a:p>
-        </p:txBody>
-      </p:sp>
-      <p:sp>
-        <p:nvSpPr>
-          <p:cNvPr id="15" name="Oval 14"/>
-          <p:cNvSpPr/>
-          <p:nvPr/>
-        </p:nvSpPr>
-        <p:spPr>
-          <a:xfrm>
-            <a:off x="2467302" y="3131593"/>
-            <a:ext cx="472565" cy="471234"/>
-          </a:xfrm>
-          <a:prstGeom prst="ellipse">
-            <a:avLst/>
-          </a:prstGeom>
-          <a:solidFill>
-            <a:srgbClr val="008000"/>
-          </a:solidFill>
-          <a:ln w="3175" cmpd="sng">
-            <a:solidFill>
-              <a:schemeClr val="bg1"/>
-            </a:solidFill>
-          </a:ln>
-          <a:effectLst/>
-        </p:spPr>
-        <p:style>
-          <a:lnRef idx="1">
-            <a:schemeClr val="accent1"/>
-          </a:lnRef>
-          <a:fillRef idx="3">
-            <a:schemeClr val="accent1"/>
-          </a:fillRef>
-          <a:effectRef idx="2">
-            <a:schemeClr val="accent1"/>
-          </a:effectRef>
-          <a:fontRef idx="minor">
-            <a:schemeClr val="lt1"/>
-          </a:fontRef>
-        </p:style>
-        <p:txBody>
-          <a:bodyPr rtlCol="0" anchor="ctr"/>
-          <a:lstStyle/>
-          <a:p>
-            <a:pPr algn="ctr"/>
-            <a:endParaRPr lang="en-US"/>
-          </a:p>
-        </p:txBody>
-      </p:sp>
-      <p:sp>
-        <p:nvSpPr>
-          <p:cNvPr id="16" name="Oval 15"/>
-          <p:cNvSpPr/>
-          <p:nvPr/>
-        </p:nvSpPr>
-        <p:spPr>
-          <a:xfrm>
-            <a:off x="2901344" y="4509939"/>
-            <a:ext cx="472565" cy="471234"/>
-          </a:xfrm>
-          <a:prstGeom prst="ellipse">
-            <a:avLst/>
-          </a:prstGeom>
-          <a:solidFill>
-            <a:srgbClr val="008000"/>
-          </a:solidFill>
-          <a:ln w="3175" cmpd="sng">
-            <a:solidFill>
-              <a:schemeClr val="bg1"/>
-            </a:solidFill>
-          </a:ln>
-          <a:effectLst/>
-        </p:spPr>
-        <p:style>
-          <a:lnRef idx="1">
-            <a:schemeClr val="accent1"/>
-          </a:lnRef>
-          <a:fillRef idx="3">
-            <a:schemeClr val="accent1"/>
-          </a:fillRef>
-          <a:effectRef idx="2">
-            <a:schemeClr val="accent1"/>
-          </a:effectRef>
-          <a:fontRef idx="minor">
-            <a:schemeClr val="lt1"/>
-          </a:fontRef>
-        </p:style>
-        <p:txBody>
-          <a:bodyPr rtlCol="0" anchor="ctr"/>
-          <a:lstStyle/>
-          <a:p>
-            <a:pPr algn="ctr"/>
-            <a:endParaRPr lang="en-US"/>
-          </a:p>
-        </p:txBody>
-      </p:sp>
-      <p:sp>
-        <p:nvSpPr>
-          <p:cNvPr id="17" name="Oval 16"/>
-          <p:cNvSpPr/>
-          <p:nvPr/>
-        </p:nvSpPr>
-        <p:spPr>
-          <a:xfrm>
-            <a:off x="4539238" y="5257713"/>
-            <a:ext cx="472565" cy="471234"/>
-          </a:xfrm>
-          <a:prstGeom prst="ellipse">
-            <a:avLst/>
-          </a:prstGeom>
-          <a:solidFill>
-            <a:srgbClr val="008000"/>
-          </a:solidFill>
-          <a:ln w="3175" cmpd="sng">
-            <a:solidFill>
-              <a:schemeClr val="bg1"/>
-            </a:solidFill>
-          </a:ln>
-          <a:effectLst/>
-        </p:spPr>
-        <p:style>
-          <a:lnRef idx="1">
-            <a:schemeClr val="accent1"/>
-          </a:lnRef>
-          <a:fillRef idx="3">
-            <a:schemeClr val="accent1"/>
-          </a:fillRef>
-          <a:effectRef idx="2">
-            <a:schemeClr val="accent1"/>
-          </a:effectRef>
-          <a:fontRef idx="minor">
-            <a:schemeClr val="lt1"/>
-          </a:fontRef>
-        </p:style>
-        <p:txBody>
-          <a:bodyPr rtlCol="0" anchor="ctr"/>
-          <a:lstStyle/>
-          <a:p>
-            <a:pPr algn="ctr"/>
-            <a:endParaRPr lang="en-US"/>
-          </a:p>
-        </p:txBody>
-      </p:sp>
     </p:spTree>
     <p:extLst>
       <p:ext uri="{BB962C8B-B14F-4D97-AF65-F5344CB8AC3E}">
-        <p14:creationId xmlns:p14="http://schemas.microsoft.com/office/powerpoint/2010/main" val="2210531515"/>
+        <p14:creationId xmlns:p14="http://schemas.microsoft.com/office/powerpoint/2010/main" val="3503586678"/>
       </p:ext>
     </p:extLst>
   </p:cSld>

</xml_diff>